<commit_message>
added the version from noon on Nov 24th of sc_model.ipynb and saved it
</commit_message>
<xml_diff>
--- a/Project4_SalesPredictor.pptx
+++ b/Project4_SalesPredictor.pptx
@@ -212,16 +212,24 @@
   <pc:docChgLst>
     <pc:chgData name="John Clos" userId="35f71590851144db" providerId="LiveId" clId="{43B72177-8ECD-4138-8B60-08547D0BC014}"/>
     <pc:docChg chg="custSel addSld modSld">
-      <pc:chgData name="John Clos" userId="35f71590851144db" providerId="LiveId" clId="{43B72177-8ECD-4138-8B60-08547D0BC014}" dt="2021-11-25T19:13:18.054" v="149" actId="20577"/>
+      <pc:chgData name="John Clos" userId="35f71590851144db" providerId="LiveId" clId="{43B72177-8ECD-4138-8B60-08547D0BC014}" dt="2021-11-26T23:28:04.372" v="150" actId="20577"/>
       <pc:docMkLst>
         <pc:docMk/>
       </pc:docMkLst>
       <pc:sldChg chg="modSp mod">
-        <pc:chgData name="John Clos" userId="35f71590851144db" providerId="LiveId" clId="{43B72177-8ECD-4138-8B60-08547D0BC014}" dt="2021-11-25T19:13:18.054" v="149" actId="20577"/>
+        <pc:chgData name="John Clos" userId="35f71590851144db" providerId="LiveId" clId="{43B72177-8ECD-4138-8B60-08547D0BC014}" dt="2021-11-26T23:28:04.372" v="150" actId="20577"/>
         <pc:sldMkLst>
           <pc:docMk/>
           <pc:sldMk cId="344080127" sldId="256"/>
         </pc:sldMkLst>
+        <pc:spChg chg="mod">
+          <ac:chgData name="John Clos" userId="35f71590851144db" providerId="LiveId" clId="{43B72177-8ECD-4138-8B60-08547D0BC014}" dt="2021-11-26T23:28:04.372" v="150" actId="20577"/>
+          <ac:spMkLst>
+            <pc:docMk/>
+            <pc:sldMk cId="344080127" sldId="256"/>
+            <ac:spMk id="2" creationId="{00000000-0000-0000-0000-000000000000}"/>
+          </ac:spMkLst>
+        </pc:spChg>
         <pc:spChg chg="mod">
           <ac:chgData name="John Clos" userId="35f71590851144db" providerId="LiveId" clId="{43B72177-8ECD-4138-8B60-08547D0BC014}" dt="2021-11-25T19:13:18.054" v="149" actId="20577"/>
           <ac:spMkLst>
@@ -13890,7 +13898,7 @@
           <a:p>
             <a:fld id="{AC8CEC3D-96F7-401F-9673-3EE7F75C9C5B}" type="datetimeFigureOut">
               <a:rPr lang="en-US"/>
-              <a:t>11/25/2021</a:t>
+              <a:t>11/26/2021</a:t>
             </a:fld>
             <a:endParaRPr dirty="0"/>
           </a:p>
@@ -14055,7 +14063,7 @@
           <a:p>
             <a:fld id="{F032BCF4-D26D-4DAF-9F57-FE1E61FE7935}" type="datetimeFigureOut">
               <a:rPr lang="en-US"/>
-              <a:t>11/25/2021</a:t>
+              <a:t>11/26/2021</a:t>
             </a:fld>
             <a:endParaRPr dirty="0"/>
           </a:p>
@@ -14882,7 +14890,7 @@
           <a:p>
             <a:fld id="{DAD2365B-5397-4552-89D2-3C31D6B894C4}" type="datetime1">
               <a:rPr lang="en-US" smtClean="0"/>
-              <a:t>11/25/2021</a:t>
+              <a:t>11/26/2021</a:t>
             </a:fld>
             <a:endParaRPr lang="en-US" dirty="0"/>
           </a:p>
@@ -15111,7 +15119,7 @@
           <a:p>
             <a:fld id="{3718D474-84CF-40A5-B032-DFFDE135438A}" type="datetime1">
               <a:rPr lang="en-US" smtClean="0"/>
-              <a:t>11/25/2021</a:t>
+              <a:t>11/26/2021</a:t>
             </a:fld>
             <a:endParaRPr lang="en-US" dirty="0"/>
           </a:p>
@@ -15333,7 +15341,7 @@
           <a:p>
             <a:fld id="{7067C6EF-6B90-465F-AC36-47BDECADBD65}" type="datetime1">
               <a:rPr lang="en-US" smtClean="0"/>
-              <a:t>11/25/2021</a:t>
+              <a:t>11/26/2021</a:t>
             </a:fld>
             <a:endParaRPr lang="en-US" dirty="0"/>
           </a:p>
@@ -15550,7 +15558,7 @@
           <a:p>
             <a:fld id="{ED1E4A86-2703-4937-ABF7-D8FBDB5C3D3E}" type="datetime1">
               <a:rPr lang="en-US" smtClean="0"/>
-              <a:t>11/25/2021</a:t>
+              <a:t>11/26/2021</a:t>
             </a:fld>
             <a:endParaRPr lang="en-US" dirty="0"/>
           </a:p>
@@ -15816,7 +15824,7 @@
           <a:p>
             <a:fld id="{12E02F23-BD92-4B7B-9DFF-42EEC8F21ED4}" type="datetime1">
               <a:rPr lang="en-US" smtClean="0"/>
-              <a:t>11/25/2021</a:t>
+              <a:t>11/26/2021</a:t>
             </a:fld>
             <a:endParaRPr lang="en-US" dirty="0"/>
           </a:p>
@@ -16118,7 +16126,7 @@
           <a:p>
             <a:fld id="{8814B7EA-8738-442B-ADC7-3A7E6F5C49CD}" type="datetime1">
               <a:rPr lang="en-US" smtClean="0"/>
-              <a:t>11/25/2021</a:t>
+              <a:t>11/26/2021</a:t>
             </a:fld>
             <a:endParaRPr lang="en-US" dirty="0"/>
           </a:p>
@@ -16568,7 +16576,7 @@
           <a:p>
             <a:fld id="{8FE5692D-78A6-499F-901A-E660774CC8EE}" type="datetime1">
               <a:rPr lang="en-US" smtClean="0"/>
-              <a:t>11/25/2021</a:t>
+              <a:t>11/26/2021</a:t>
             </a:fld>
             <a:endParaRPr lang="en-US" dirty="0"/>
           </a:p>
@@ -16701,7 +16709,7 @@
           <a:p>
             <a:fld id="{6776F355-F21B-43C0-ABBD-B5AEBBE279A6}" type="datetime1">
               <a:rPr lang="en-US" smtClean="0"/>
-              <a:t>11/25/2021</a:t>
+              <a:t>11/26/2021</a:t>
             </a:fld>
             <a:endParaRPr lang="en-US" dirty="0"/>
           </a:p>
@@ -16811,7 +16819,7 @@
           <a:p>
             <a:fld id="{C0AB95E7-F437-40FB-91EE-0B08B57CB523}" type="datetime1">
               <a:rPr lang="en-US" smtClean="0"/>
-              <a:t>11/25/2021</a:t>
+              <a:t>11/26/2021</a:t>
             </a:fld>
             <a:endParaRPr lang="en-US" dirty="0"/>
           </a:p>
@@ -17111,7 +17119,7 @@
           <a:p>
             <a:fld id="{67709EEF-87D9-4049-9A5D-A2B5E4C83A85}" type="datetime1">
               <a:rPr lang="en-US" smtClean="0"/>
-              <a:t>11/25/2021</a:t>
+              <a:t>11/26/2021</a:t>
             </a:fld>
             <a:endParaRPr lang="en-US" dirty="0"/>
           </a:p>
@@ -17400,7 +17408,7 @@
           <a:p>
             <a:fld id="{CAEBD992-82F2-4752-BCD7-4BDCCFA26099}" type="datetime1">
               <a:rPr lang="en-US" smtClean="0"/>
-              <a:t>11/25/2021</a:t>
+              <a:t>11/26/2021</a:t>
             </a:fld>
             <a:endParaRPr lang="en-US" dirty="0"/>
           </a:p>
@@ -17698,7 +17706,7 @@
             <a:fld id="{7590C4DA-EDE6-465C-B91D-0B6D7078AFBA}" type="datetime1">
               <a:rPr lang="en-US" smtClean="0"/>
               <a:pPr/>
-              <a:t>11/25/2021</a:t>
+              <a:t>11/26/2021</a:t>
             </a:fld>
             <a:endParaRPr lang="en-US" dirty="0"/>
           </a:p>
@@ -18149,7 +18157,14 @@
           <a:p>
             <a:r>
               <a:rPr lang="en-US" dirty="0"/>
-              <a:t>Project 4:  S-Mart Sales Predictor</a:t>
+              <a:t>Project 4:  </a:t>
+            </a:r>
+            <a:br>
+              <a:rPr lang="en-US" dirty="0"/>
+            </a:br>
+            <a:r>
+              <a:rPr lang="en-US" dirty="0"/>
+              <a:t>S-Mart Sales Predictor</a:t>
             </a:r>
           </a:p>
         </p:txBody>
@@ -18526,13 +18541,13 @@
   <p:clrMapOvr>
     <a:masterClrMapping/>
   </p:clrMapOvr>
-  <mc:AlternateContent xmlns:mc="http://schemas.openxmlformats.org/markup-compatibility/2006">
-    <mc:Choice xmlns:p14="http://schemas.microsoft.com/office/powerpoint/2010/main" Requires="p14">
+  <mc:AlternateContent xmlns:mc="http://schemas.openxmlformats.org/markup-compatibility/2006" xmlns:p14="http://schemas.microsoft.com/office/powerpoint/2010/main">
+    <mc:Choice Requires="p14">
       <p:transition spd="med" p14:dur="700">
         <p:fade/>
       </p:transition>
     </mc:Choice>
-    <mc:Fallback>
+    <mc:Fallback xmlns="">
       <p:transition spd="med">
         <p:fade/>
       </p:transition>
@@ -18813,13 +18828,13 @@
   <p:clrMapOvr>
     <a:masterClrMapping/>
   </p:clrMapOvr>
-  <mc:AlternateContent xmlns:mc="http://schemas.openxmlformats.org/markup-compatibility/2006">
-    <mc:Choice xmlns:p14="http://schemas.microsoft.com/office/powerpoint/2010/main" Requires="p14">
+  <mc:AlternateContent xmlns:mc="http://schemas.openxmlformats.org/markup-compatibility/2006" xmlns:p14="http://schemas.microsoft.com/office/powerpoint/2010/main">
+    <mc:Choice Requires="p14">
       <p:transition spd="med" p14:dur="700">
         <p:fade/>
       </p:transition>
     </mc:Choice>
-    <mc:Fallback>
+    <mc:Fallback xmlns="">
       <p:transition spd="med">
         <p:fade/>
       </p:transition>
@@ -19178,13 +19193,13 @@
   <p:clrMapOvr>
     <a:masterClrMapping/>
   </p:clrMapOvr>
-  <mc:AlternateContent xmlns:mc="http://schemas.openxmlformats.org/markup-compatibility/2006">
-    <mc:Choice xmlns:p14="http://schemas.microsoft.com/office/powerpoint/2010/main" Requires="p14">
+  <mc:AlternateContent xmlns:mc="http://schemas.openxmlformats.org/markup-compatibility/2006" xmlns:p14="http://schemas.microsoft.com/office/powerpoint/2010/main">
+    <mc:Choice Requires="p14">
       <p:transition spd="med" p14:dur="700">
         <p:fade/>
       </p:transition>
     </mc:Choice>
-    <mc:Fallback>
+    <mc:Fallback xmlns="">
       <p:transition spd="med">
         <p:fade/>
       </p:transition>

</xml_diff>

<commit_message>
updated read me file
</commit_message>
<xml_diff>
--- a/Project4_SalesPredictor.pptx
+++ b/Project4_SalesPredictor.pptx
@@ -199,14 +199,6 @@
 </p:presentation>
 </file>
 
-<file path=ppt/revisionInfo.xml><?xml version="1.0" encoding="utf-8"?>
-<p1510:revInfo xmlns:a="http://schemas.openxmlformats.org/drawingml/2006/main" xmlns:r="http://schemas.openxmlformats.org/officeDocument/2006/relationships" xmlns:p1510="http://schemas.microsoft.com/office/powerpoint/2015/10/main">
-  <p1510:revLst>
-    <p1510:client id="{43B72177-8ECD-4138-8B60-08547D0BC014}" v="2" dt="2021-11-25T19:13:23.084"/>
-  </p1510:revLst>
-</p1510:revInfo>
-</file>
-
 <file path=ppt/changesInfos/changesInfo1.xml><?xml version="1.0" encoding="utf-8"?>
 <pc:chgInfo xmlns:a="http://schemas.openxmlformats.org/drawingml/2006/main" xmlns:r="http://schemas.openxmlformats.org/officeDocument/2006/relationships" xmlns:ac="http://schemas.microsoft.com/office/drawing/2013/main/command" xmlns:pc="http://schemas.microsoft.com/office/powerpoint/2013/main/command">
   <pc:docChgLst>
@@ -368,6 +360,138 @@
           <pc:docMk/>
           <pc:sldMk cId="391894709" sldId="268"/>
         </pc:sldMkLst>
+      </pc:sldChg>
+    </pc:docChg>
+  </pc:docChgLst>
+  <pc:docChgLst>
+    <pc:chgData name="John Clos" userId="35f71590851144db" providerId="LiveId" clId="{58E8EA7F-7C44-4580-9B47-C6E7E8D7B6BA}"/>
+    <pc:docChg chg="undo custSel modSld">
+      <pc:chgData name="John Clos" userId="35f71590851144db" providerId="LiveId" clId="{58E8EA7F-7C44-4580-9B47-C6E7E8D7B6BA}" dt="2021-11-30T03:05:15.171" v="299" actId="20577"/>
+      <pc:docMkLst>
+        <pc:docMk/>
+      </pc:docMkLst>
+      <pc:sldChg chg="addSp delSp modSp mod">
+        <pc:chgData name="John Clos" userId="35f71590851144db" providerId="LiveId" clId="{58E8EA7F-7C44-4580-9B47-C6E7E8D7B6BA}" dt="2021-11-30T01:45:20.259" v="2" actId="22"/>
+        <pc:sldMkLst>
+          <pc:docMk/>
+          <pc:sldMk cId="379348850" sldId="257"/>
+        </pc:sldMkLst>
+        <pc:spChg chg="del">
+          <ac:chgData name="John Clos" userId="35f71590851144db" providerId="LiveId" clId="{58E8EA7F-7C44-4580-9B47-C6E7E8D7B6BA}" dt="2021-11-30T01:45:14.757" v="0" actId="478"/>
+          <ac:spMkLst>
+            <pc:docMk/>
+            <pc:sldMk cId="379348850" sldId="257"/>
+            <ac:spMk id="3" creationId="{00000000-0000-0000-0000-000000000000}"/>
+          </ac:spMkLst>
+        </pc:spChg>
+        <pc:spChg chg="add del mod">
+          <ac:chgData name="John Clos" userId="35f71590851144db" providerId="LiveId" clId="{58E8EA7F-7C44-4580-9B47-C6E7E8D7B6BA}" dt="2021-11-30T01:45:19.044" v="1" actId="478"/>
+          <ac:spMkLst>
+            <pc:docMk/>
+            <pc:sldMk cId="379348850" sldId="257"/>
+            <ac:spMk id="5" creationId="{2DE190DB-AAEE-4114-B79C-6004D0AFC57B}"/>
+          </ac:spMkLst>
+        </pc:spChg>
+        <pc:picChg chg="add">
+          <ac:chgData name="John Clos" userId="35f71590851144db" providerId="LiveId" clId="{58E8EA7F-7C44-4580-9B47-C6E7E8D7B6BA}" dt="2021-11-30T01:45:20.259" v="2" actId="22"/>
+          <ac:picMkLst>
+            <pc:docMk/>
+            <pc:sldMk cId="379348850" sldId="257"/>
+            <ac:picMk id="7" creationId="{7FAD9DCD-A595-4EF2-94B3-7A7595690736}"/>
+          </ac:picMkLst>
+        </pc:picChg>
+      </pc:sldChg>
+      <pc:sldChg chg="modSp mod">
+        <pc:chgData name="John Clos" userId="35f71590851144db" providerId="LiveId" clId="{58E8EA7F-7C44-4580-9B47-C6E7E8D7B6BA}" dt="2021-11-30T03:05:15.171" v="299" actId="20577"/>
+        <pc:sldMkLst>
+          <pc:docMk/>
+          <pc:sldMk cId="3415676531" sldId="263"/>
+        </pc:sldMkLst>
+        <pc:spChg chg="mod">
+          <ac:chgData name="John Clos" userId="35f71590851144db" providerId="LiveId" clId="{58E8EA7F-7C44-4580-9B47-C6E7E8D7B6BA}" dt="2021-11-30T03:05:15.171" v="299" actId="20577"/>
+          <ac:spMkLst>
+            <pc:docMk/>
+            <pc:sldMk cId="3415676531" sldId="263"/>
+            <ac:spMk id="3" creationId="{00000000-0000-0000-0000-000000000000}"/>
+          </ac:spMkLst>
+        </pc:spChg>
+      </pc:sldChg>
+      <pc:sldChg chg="addSp delSp modSp mod">
+        <pc:chgData name="John Clos" userId="35f71590851144db" providerId="LiveId" clId="{58E8EA7F-7C44-4580-9B47-C6E7E8D7B6BA}" dt="2021-11-30T03:02:11.817" v="142" actId="14100"/>
+        <pc:sldMkLst>
+          <pc:docMk/>
+          <pc:sldMk cId="2624389181" sldId="264"/>
+        </pc:sldMkLst>
+        <pc:spChg chg="mod">
+          <ac:chgData name="John Clos" userId="35f71590851144db" providerId="LiveId" clId="{58E8EA7F-7C44-4580-9B47-C6E7E8D7B6BA}" dt="2021-11-30T03:02:11.817" v="142" actId="14100"/>
+          <ac:spMkLst>
+            <pc:docMk/>
+            <pc:sldMk cId="2624389181" sldId="264"/>
+            <ac:spMk id="3" creationId="{00000000-0000-0000-0000-000000000000}"/>
+          </ac:spMkLst>
+        </pc:spChg>
+        <pc:spChg chg="add del mod">
+          <ac:chgData name="John Clos" userId="35f71590851144db" providerId="LiveId" clId="{58E8EA7F-7C44-4580-9B47-C6E7E8D7B6BA}" dt="2021-11-30T03:02:00.535" v="141" actId="478"/>
+          <ac:spMkLst>
+            <pc:docMk/>
+            <pc:sldMk cId="2624389181" sldId="264"/>
+            <ac:spMk id="5" creationId="{A6976BAB-220A-406A-BF0F-C633D613DEC8}"/>
+          </ac:spMkLst>
+        </pc:spChg>
+        <pc:spChg chg="del">
+          <ac:chgData name="John Clos" userId="35f71590851144db" providerId="LiveId" clId="{58E8EA7F-7C44-4580-9B47-C6E7E8D7B6BA}" dt="2021-11-30T03:01:56.516" v="140" actId="478"/>
+          <ac:spMkLst>
+            <pc:docMk/>
+            <pc:sldMk cId="2624389181" sldId="264"/>
+            <ac:spMk id="6" creationId="{00000000-0000-0000-0000-000000000000}"/>
+          </ac:spMkLst>
+        </pc:spChg>
+      </pc:sldChg>
+      <pc:sldChg chg="modSp mod">
+        <pc:chgData name="John Clos" userId="35f71590851144db" providerId="LiveId" clId="{58E8EA7F-7C44-4580-9B47-C6E7E8D7B6BA}" dt="2021-11-30T01:49:37.688" v="53" actId="20577"/>
+        <pc:sldMkLst>
+          <pc:docMk/>
+          <pc:sldMk cId="384745142" sldId="266"/>
+        </pc:sldMkLst>
+        <pc:spChg chg="mod">
+          <ac:chgData name="John Clos" userId="35f71590851144db" providerId="LiveId" clId="{58E8EA7F-7C44-4580-9B47-C6E7E8D7B6BA}" dt="2021-11-30T01:49:37.688" v="53" actId="20577"/>
+          <ac:spMkLst>
+            <pc:docMk/>
+            <pc:sldMk cId="384745142" sldId="266"/>
+            <ac:spMk id="3" creationId="{00000000-0000-0000-0000-000000000000}"/>
+          </ac:spMkLst>
+        </pc:spChg>
+      </pc:sldChg>
+      <pc:sldChg chg="addSp delSp modSp mod">
+        <pc:chgData name="John Clos" userId="35f71590851144db" providerId="LiveId" clId="{58E8EA7F-7C44-4580-9B47-C6E7E8D7B6BA}" dt="2021-11-30T03:02:35.948" v="146" actId="14100"/>
+        <pc:sldMkLst>
+          <pc:docMk/>
+          <pc:sldMk cId="1607059164" sldId="267"/>
+        </pc:sldMkLst>
+        <pc:spChg chg="mod">
+          <ac:chgData name="John Clos" userId="35f71590851144db" providerId="LiveId" clId="{58E8EA7F-7C44-4580-9B47-C6E7E8D7B6BA}" dt="2021-11-30T03:02:35.948" v="146" actId="14100"/>
+          <ac:spMkLst>
+            <pc:docMk/>
+            <pc:sldMk cId="1607059164" sldId="267"/>
+            <ac:spMk id="3" creationId="{00000000-0000-0000-0000-000000000000}"/>
+          </ac:spMkLst>
+        </pc:spChg>
+        <pc:spChg chg="add del mod">
+          <ac:chgData name="John Clos" userId="35f71590851144db" providerId="LiveId" clId="{58E8EA7F-7C44-4580-9B47-C6E7E8D7B6BA}" dt="2021-11-30T03:01:10.102" v="55" actId="478"/>
+          <ac:spMkLst>
+            <pc:docMk/>
+            <pc:sldMk cId="1607059164" sldId="267"/>
+            <ac:spMk id="5" creationId="{6342B630-358C-481D-A509-1D71E75733AB}"/>
+          </ac:spMkLst>
+        </pc:spChg>
+        <pc:spChg chg="del">
+          <ac:chgData name="John Clos" userId="35f71590851144db" providerId="LiveId" clId="{58E8EA7F-7C44-4580-9B47-C6E7E8D7B6BA}" dt="2021-11-30T03:01:08.014" v="54" actId="478"/>
+          <ac:spMkLst>
+            <pc:docMk/>
+            <pc:sldMk cId="1607059164" sldId="267"/>
+            <ac:spMk id="6" creationId="{00000000-0000-0000-0000-000000000000}"/>
+          </ac:spMkLst>
+        </pc:spChg>
       </pc:sldChg>
     </pc:docChg>
   </pc:docChgLst>
@@ -13898,7 +14022,7 @@
           <a:p>
             <a:fld id="{AC8CEC3D-96F7-401F-9673-3EE7F75C9C5B}" type="datetimeFigureOut">
               <a:rPr lang="en-US"/>
-              <a:t>11/26/2021</a:t>
+              <a:t>11/29/2021</a:t>
             </a:fld>
             <a:endParaRPr dirty="0"/>
           </a:p>
@@ -14063,7 +14187,7 @@
           <a:p>
             <a:fld id="{F032BCF4-D26D-4DAF-9F57-FE1E61FE7935}" type="datetimeFigureOut">
               <a:rPr lang="en-US"/>
-              <a:t>11/26/2021</a:t>
+              <a:t>11/29/2021</a:t>
             </a:fld>
             <a:endParaRPr dirty="0"/>
           </a:p>
@@ -14890,7 +15014,7 @@
           <a:p>
             <a:fld id="{DAD2365B-5397-4552-89D2-3C31D6B894C4}" type="datetime1">
               <a:rPr lang="en-US" smtClean="0"/>
-              <a:t>11/26/2021</a:t>
+              <a:t>11/29/2021</a:t>
             </a:fld>
             <a:endParaRPr lang="en-US" dirty="0"/>
           </a:p>
@@ -15119,7 +15243,7 @@
           <a:p>
             <a:fld id="{3718D474-84CF-40A5-B032-DFFDE135438A}" type="datetime1">
               <a:rPr lang="en-US" smtClean="0"/>
-              <a:t>11/26/2021</a:t>
+              <a:t>11/29/2021</a:t>
             </a:fld>
             <a:endParaRPr lang="en-US" dirty="0"/>
           </a:p>
@@ -15341,7 +15465,7 @@
           <a:p>
             <a:fld id="{7067C6EF-6B90-465F-AC36-47BDECADBD65}" type="datetime1">
               <a:rPr lang="en-US" smtClean="0"/>
-              <a:t>11/26/2021</a:t>
+              <a:t>11/29/2021</a:t>
             </a:fld>
             <a:endParaRPr lang="en-US" dirty="0"/>
           </a:p>
@@ -15558,7 +15682,7 @@
           <a:p>
             <a:fld id="{ED1E4A86-2703-4937-ABF7-D8FBDB5C3D3E}" type="datetime1">
               <a:rPr lang="en-US" smtClean="0"/>
-              <a:t>11/26/2021</a:t>
+              <a:t>11/29/2021</a:t>
             </a:fld>
             <a:endParaRPr lang="en-US" dirty="0"/>
           </a:p>
@@ -15824,7 +15948,7 @@
           <a:p>
             <a:fld id="{12E02F23-BD92-4B7B-9DFF-42EEC8F21ED4}" type="datetime1">
               <a:rPr lang="en-US" smtClean="0"/>
-              <a:t>11/26/2021</a:t>
+              <a:t>11/29/2021</a:t>
             </a:fld>
             <a:endParaRPr lang="en-US" dirty="0"/>
           </a:p>
@@ -16126,7 +16250,7 @@
           <a:p>
             <a:fld id="{8814B7EA-8738-442B-ADC7-3A7E6F5C49CD}" type="datetime1">
               <a:rPr lang="en-US" smtClean="0"/>
-              <a:t>11/26/2021</a:t>
+              <a:t>11/29/2021</a:t>
             </a:fld>
             <a:endParaRPr lang="en-US" dirty="0"/>
           </a:p>
@@ -16576,7 +16700,7 @@
           <a:p>
             <a:fld id="{8FE5692D-78A6-499F-901A-E660774CC8EE}" type="datetime1">
               <a:rPr lang="en-US" smtClean="0"/>
-              <a:t>11/26/2021</a:t>
+              <a:t>11/29/2021</a:t>
             </a:fld>
             <a:endParaRPr lang="en-US" dirty="0"/>
           </a:p>
@@ -16709,7 +16833,7 @@
           <a:p>
             <a:fld id="{6776F355-F21B-43C0-ABBD-B5AEBBE279A6}" type="datetime1">
               <a:rPr lang="en-US" smtClean="0"/>
-              <a:t>11/26/2021</a:t>
+              <a:t>11/29/2021</a:t>
             </a:fld>
             <a:endParaRPr lang="en-US" dirty="0"/>
           </a:p>
@@ -16819,7 +16943,7 @@
           <a:p>
             <a:fld id="{C0AB95E7-F437-40FB-91EE-0B08B57CB523}" type="datetime1">
               <a:rPr lang="en-US" smtClean="0"/>
-              <a:t>11/26/2021</a:t>
+              <a:t>11/29/2021</a:t>
             </a:fld>
             <a:endParaRPr lang="en-US" dirty="0"/>
           </a:p>
@@ -17119,7 +17243,7 @@
           <a:p>
             <a:fld id="{67709EEF-87D9-4049-9A5D-A2B5E4C83A85}" type="datetime1">
               <a:rPr lang="en-US" smtClean="0"/>
-              <a:t>11/26/2021</a:t>
+              <a:t>11/29/2021</a:t>
             </a:fld>
             <a:endParaRPr lang="en-US" dirty="0"/>
           </a:p>
@@ -17408,7 +17532,7 @@
           <a:p>
             <a:fld id="{CAEBD992-82F2-4752-BCD7-4BDCCFA26099}" type="datetime1">
               <a:rPr lang="en-US" smtClean="0"/>
-              <a:t>11/26/2021</a:t>
+              <a:t>11/29/2021</a:t>
             </a:fld>
             <a:endParaRPr lang="en-US" dirty="0"/>
           </a:p>
@@ -17706,7 +17830,7 @@
             <a:fld id="{7590C4DA-EDE6-465C-B91D-0B6D7078AFBA}" type="datetime1">
               <a:rPr lang="en-US" smtClean="0"/>
               <a:pPr/>
-              <a:t>11/26/2021</a:t>
+              <a:t>11/29/2021</a:t>
             </a:fld>
             <a:endParaRPr lang="en-US" dirty="0"/>
           </a:p>
@@ -18280,72 +18404,19 @@
             <p:ph sz="half" idx="1"/>
           </p:nvPr>
         </p:nvSpPr>
-        <p:spPr/>
+        <p:spPr>
+          <a:xfrm>
+            <a:off x="1293813" y="685800"/>
+            <a:ext cx="10287000" cy="4191000"/>
+          </a:xfrm>
+        </p:spPr>
         <p:txBody>
           <a:bodyPr/>
           <a:lstStyle/>
           <a:p>
             <a:r>
               <a:rPr lang="en-US" dirty="0"/>
-              <a:t>Outline the drawbacks of the current model</a:t>
-            </a:r>
-          </a:p>
-        </p:txBody>
-      </p:sp>
-      <p:sp>
-        <p:nvSpPr>
-          <p:cNvPr id="6" name="Content Placeholder 5"/>
-          <p:cNvSpPr>
-            <a:spLocks noGrp="1"/>
-          </p:cNvSpPr>
-          <p:nvPr>
-            <p:ph sz="half" idx="2"/>
-          </p:nvPr>
-        </p:nvSpPr>
-        <p:spPr/>
-        <p:txBody>
-          <a:bodyPr/>
-          <a:lstStyle/>
-          <a:p>
-            <a:pPr lvl="2"/>
-            <a:r>
-              <a:rPr lang="en-US" dirty="0"/>
-              <a:t>Submit a research proposal</a:t>
-            </a:r>
-          </a:p>
-          <a:p>
-            <a:pPr lvl="3"/>
-            <a:r>
-              <a:rPr lang="en-US" dirty="0"/>
-              <a:t>Then, we’ll submit a proposal for your evaluation.</a:t>
-            </a:r>
-          </a:p>
-          <a:p>
-            <a:pPr lvl="2"/>
-            <a:r>
-              <a:rPr lang="en-US" dirty="0"/>
-              <a:t>Begin the research</a:t>
-            </a:r>
-          </a:p>
-          <a:p>
-            <a:pPr lvl="3"/>
-            <a:r>
-              <a:rPr lang="en-US" dirty="0"/>
-              <a:t>When the proposal is approved, we will assemble an experienced team to conduct your research and analyze the findings.</a:t>
-            </a:r>
-          </a:p>
-          <a:p>
-            <a:pPr lvl="2"/>
-            <a:r>
-              <a:rPr lang="en-US" dirty="0"/>
-              <a:t>Provide ongoing support</a:t>
-            </a:r>
-          </a:p>
-          <a:p>
-            <a:pPr lvl="3"/>
-            <a:r>
-              <a:rPr lang="en-US" dirty="0"/>
-              <a:t>We will continue to work with you after we deliver your report so you get the most value out of the research findings.</a:t>
+              <a:t>We were limited in the amount of data that we had</a:t>
             </a:r>
           </a:p>
         </p:txBody>
@@ -18425,108 +18496,22 @@
             <p:ph sz="half" idx="1"/>
           </p:nvPr>
         </p:nvSpPr>
-        <p:spPr/>
+        <p:spPr>
+          <a:xfrm>
+            <a:off x="1293812" y="685800"/>
+            <a:ext cx="10287001" cy="4191000"/>
+          </a:xfrm>
+        </p:spPr>
         <p:txBody>
           <a:bodyPr/>
           <a:lstStyle/>
           <a:p>
             <a:r>
-              <a:rPr lang="en-US"/>
-              <a:t>Outline the next steps for ordering or purchasing your products </a:t>
-            </a:r>
-            <a:br>
-              <a:rPr lang="en-US"/>
-            </a:br>
-            <a:r>
-              <a:rPr lang="en-US"/>
-              <a:t>or services.</a:t>
+              <a:rPr lang="en-US" dirty="0"/>
+              <a:t>Find more data and retrain</a:t>
             </a:r>
           </a:p>
           <a:p>
-            <a:r>
-              <a:rPr lang="en-US"/>
-              <a:t>Example:</a:t>
-            </a:r>
-          </a:p>
-          <a:p>
-            <a:pPr lvl="1"/>
-            <a:r>
-              <a:rPr lang="en-US"/>
-              <a:t>To commission research from Trey Research:</a:t>
-            </a:r>
-          </a:p>
-          <a:p>
-            <a:pPr lvl="2"/>
-            <a:r>
-              <a:rPr lang="en-US"/>
-              <a:t>Define the project</a:t>
-            </a:r>
-          </a:p>
-          <a:p>
-            <a:pPr lvl="3"/>
-            <a:r>
-              <a:rPr lang="en-US"/>
-              <a:t>First, we’ll meet with you to define your project.</a:t>
-            </a:r>
-            <a:endParaRPr lang="en-US" dirty="0"/>
-          </a:p>
-        </p:txBody>
-      </p:sp>
-      <p:sp>
-        <p:nvSpPr>
-          <p:cNvPr id="6" name="Content Placeholder 5"/>
-          <p:cNvSpPr>
-            <a:spLocks noGrp="1"/>
-          </p:cNvSpPr>
-          <p:nvPr>
-            <p:ph sz="half" idx="2"/>
-          </p:nvPr>
-        </p:nvSpPr>
-        <p:spPr/>
-        <p:txBody>
-          <a:bodyPr/>
-          <a:lstStyle/>
-          <a:p>
-            <a:pPr lvl="2"/>
-            <a:r>
-              <a:rPr lang="en-US"/>
-              <a:t>Submit a research proposal</a:t>
-            </a:r>
-          </a:p>
-          <a:p>
-            <a:pPr lvl="3"/>
-            <a:r>
-              <a:rPr lang="en-US"/>
-              <a:t>Then, we’ll submit a proposal for your evaluation.</a:t>
-            </a:r>
-          </a:p>
-          <a:p>
-            <a:pPr lvl="2"/>
-            <a:r>
-              <a:rPr lang="en-US"/>
-              <a:t>Begin the research</a:t>
-            </a:r>
-          </a:p>
-          <a:p>
-            <a:pPr lvl="3"/>
-            <a:r>
-              <a:rPr lang="en-US"/>
-              <a:t>When the proposal is approved, we will assemble an experienced team to conduct your research and analyze the findings.</a:t>
-            </a:r>
-          </a:p>
-          <a:p>
-            <a:pPr lvl="2"/>
-            <a:r>
-              <a:rPr lang="en-US"/>
-              <a:t>Provide ongoing support</a:t>
-            </a:r>
-          </a:p>
-          <a:p>
-            <a:pPr lvl="3"/>
-            <a:r>
-              <a:rPr lang="en-US"/>
-              <a:t>We will continue to work with you after we deliver your report so you get the most value out of the research findings.</a:t>
-            </a:r>
             <a:endParaRPr lang="en-US" dirty="0"/>
           </a:p>
         </p:txBody>
@@ -18689,28 +18674,36 @@
           </a:p>
         </p:txBody>
       </p:sp>
-      <p:sp>
-        <p:nvSpPr>
-          <p:cNvPr id="3" name="Content Placeholder 2"/>
-          <p:cNvSpPr>
-            <a:spLocks noGrp="1"/>
-          </p:cNvSpPr>
-          <p:nvPr>
-            <p:ph idx="13"/>
-          </p:nvPr>
-        </p:nvSpPr>
-        <p:spPr/>
-        <p:txBody>
-          <a:bodyPr/>
-          <a:lstStyle/>
-          <a:p>
-            <a:r>
-              <a:rPr lang="en-US" dirty="0"/>
-              <a:t>Briefly introduce yourself and your colleagues.</a:t>
-            </a:r>
-          </a:p>
-        </p:txBody>
-      </p:sp>
+      <p:pic>
+        <p:nvPicPr>
+          <p:cNvPr id="7" name="Picture 6">
+            <a:extLst>
+              <a:ext uri="{FF2B5EF4-FFF2-40B4-BE49-F238E27FC236}">
+                <a16:creationId xmlns:a16="http://schemas.microsoft.com/office/drawing/2014/main" id="{7FAD9DCD-A595-4EF2-94B3-7A7595690736}"/>
+              </a:ext>
+            </a:extLst>
+          </p:cNvPr>
+          <p:cNvPicPr>
+            <a:picLocks noChangeAspect="1"/>
+          </p:cNvPicPr>
+          <p:nvPr/>
+        </p:nvPicPr>
+        <p:blipFill>
+          <a:blip r:embed="rId3"/>
+          <a:stretch>
+            <a:fillRect/>
+          </a:stretch>
+        </p:blipFill>
+        <p:spPr>
+          <a:xfrm>
+            <a:off x="411957" y="1509444"/>
+            <a:ext cx="11364911" cy="3839111"/>
+          </a:xfrm>
+          <a:prstGeom prst="rect">
+            <a:avLst/>
+          </a:prstGeom>
+        </p:spPr>
+      </p:pic>
     </p:spTree>
     <p:extLst>
       <p:ext uri="{BB962C8B-B14F-4D97-AF65-F5344CB8AC3E}">
@@ -18769,10 +18762,9 @@
           <a:lstStyle/>
           <a:p>
             <a:r>
-              <a:rPr lang="en-US"/>
+              <a:rPr lang="en-US" dirty="0"/>
               <a:t>Introduction</a:t>
             </a:r>
-            <a:endParaRPr lang="en-US" dirty="0"/>
           </a:p>
         </p:txBody>
       </p:sp>
@@ -18788,32 +18780,54 @@
         </p:nvSpPr>
         <p:spPr/>
         <p:txBody>
-          <a:bodyPr/>
+          <a:bodyPr>
+            <a:normAutofit fontScale="92500" lnSpcReduction="20000"/>
+          </a:bodyPr>
           <a:lstStyle/>
+          <a:p>
+            <a:pPr marL="0" indent="0">
+              <a:buNone/>
+            </a:pPr>
+            <a:r>
+              <a:rPr lang="en-US" sz="3600" dirty="0"/>
+              <a:t>S-Mart: Shop Smart, Shop S-Mart</a:t>
+            </a:r>
+            <a:endParaRPr lang="en-US" dirty="0"/>
+          </a:p>
           <a:p>
             <a:r>
               <a:rPr lang="en-US" dirty="0"/>
-              <a:t>Describe the products or services your company provides at a </a:t>
-            </a:r>
-            <a:br>
-              <a:rPr lang="en-US" dirty="0"/>
-            </a:br>
-            <a:r>
-              <a:rPr lang="en-US" dirty="0"/>
-              <a:t>high level. </a:t>
+              <a:t>For S-Mart, setting the right price for a given product is critical.</a:t>
             </a:r>
           </a:p>
           <a:p>
             <a:r>
               <a:rPr lang="en-US" dirty="0"/>
-              <a:t>Example:</a:t>
+              <a:t> If price too low, profit per unit will be too low</a:t>
             </a:r>
           </a:p>
           <a:p>
-            <a:pPr lvl="1"/>
             <a:r>
               <a:rPr lang="en-US" dirty="0"/>
-              <a:t>Trey Research offers complete solutions for strategic market planning, from global business intelligence reports to targeted market analysis.</a:t>
+              <a:t>If price too high, the units sold will be too low and product will be wasted </a:t>
+            </a:r>
+          </a:p>
+          <a:p>
+            <a:r>
+              <a:rPr lang="en-US" dirty="0"/>
+              <a:t>To maximize profits, the business needs to find the optimum price.</a:t>
+            </a:r>
+          </a:p>
+          <a:p>
+            <a:r>
+              <a:rPr lang="en-US" dirty="0"/>
+              <a:t>Using sales data, we’ve built a model to predict and compare units sold and revenue for all nine locations.</a:t>
+            </a:r>
+          </a:p>
+          <a:p>
+            <a:r>
+              <a:rPr lang="en-US" dirty="0"/>
+              <a:t>Using this model, we can ensure our locations are properly stocked and staffed for the coming week's sales.</a:t>
             </a:r>
           </a:p>
         </p:txBody>
@@ -24110,51 +24124,51 @@
           <a:lstStyle/>
           <a:p>
             <a:r>
-              <a:rPr lang="en-US"/>
-              <a:t>Summarize the key benefits provided by the product or service you are promoting.</a:t>
+              <a:rPr lang="en-US" dirty="0"/>
+              <a:t>The model predicts based on:</a:t>
             </a:r>
           </a:p>
           <a:p>
+            <a:pPr lvl="1"/>
             <a:r>
-              <a:rPr lang="en-US"/>
-              <a:t>Example:</a:t>
+              <a:rPr lang="en-US" dirty="0"/>
+              <a:t>Product</a:t>
+            </a:r>
+          </a:p>
+          <a:p>
+            <a:pPr lvl="1"/>
+            <a:r>
+              <a:rPr lang="en-US" dirty="0"/>
+              <a:t>Store</a:t>
+            </a:r>
+          </a:p>
+          <a:p>
+            <a:pPr lvl="1"/>
+            <a:r>
+              <a:rPr lang="en-US" dirty="0"/>
+              <a:t>Week of year</a:t>
+            </a:r>
+          </a:p>
+          <a:p>
+            <a:pPr lvl="1"/>
+            <a:r>
+              <a:rPr lang="en-US" dirty="0"/>
+              <a:t>Base price</a:t>
             </a:r>
           </a:p>
           <a:p>
             <a:pPr lvl="1"/>
             <a:r>
               <a:rPr lang="en-US"/>
-              <a:t>Investment in market research is an investment in your product’s success!</a:t>
+              <a:t>Actual price</a:t>
             </a:r>
+            <a:endParaRPr lang="en-US" dirty="0"/>
           </a:p>
           <a:p>
-            <a:pPr lvl="2"/>
             <a:r>
-              <a:rPr lang="en-US"/>
-              <a:t>Know your customer</a:t>
+              <a:rPr lang="en-US" dirty="0"/>
+              <a:t>It is simple and easy to retrain</a:t>
             </a:r>
-          </a:p>
-          <a:p>
-            <a:pPr lvl="2"/>
-            <a:r>
-              <a:rPr lang="en-US"/>
-              <a:t>Know your competition</a:t>
-            </a:r>
-          </a:p>
-          <a:p>
-            <a:pPr lvl="2"/>
-            <a:r>
-              <a:rPr lang="en-US"/>
-              <a:t>Timing is everything</a:t>
-            </a:r>
-          </a:p>
-          <a:p>
-            <a:pPr lvl="2"/>
-            <a:r>
-              <a:rPr lang="en-US"/>
-              <a:t>Track and adjust</a:t>
-            </a:r>
-            <a:endParaRPr lang="en-US" dirty="0"/>
           </a:p>
         </p:txBody>
       </p:sp>

</xml_diff>